<commit_message>
small update to lecture 18
</commit_message>
<xml_diff>
--- a/classes/prog2016/Prog3-Lecture18.pptx
+++ b/classes/prog2016/Prog3-Lecture18.pptx
@@ -229,7 +229,7 @@
             <a:fld id="{A7A276D0-7933-4D90-ADFD-A25AB307371A}" type="datetimeFigureOut">
               <a:rPr lang="en-US" smtClean="0"/>
               <a:pPr/>
-              <a:t>11/2/2016</a:t>
+              <a:t>11/12/2016</a:t>
             </a:fld>
             <a:endParaRPr lang="en-US"/>
           </a:p>
@@ -1822,7 +1822,7 @@
             <a:fld id="{1D8BD707-D9CF-40AE-B4C6-C98DA3205C09}" type="datetimeFigureOut">
               <a:rPr lang="en-US" smtClean="0"/>
               <a:pPr/>
-              <a:t>11/2/2016</a:t>
+              <a:t>11/12/2016</a:t>
             </a:fld>
             <a:endParaRPr lang="en-US"/>
           </a:p>
@@ -1987,7 +1987,7 @@
             <a:fld id="{1D8BD707-D9CF-40AE-B4C6-C98DA3205C09}" type="datetimeFigureOut">
               <a:rPr lang="en-US" smtClean="0"/>
               <a:pPr/>
-              <a:t>11/2/2016</a:t>
+              <a:t>11/12/2016</a:t>
             </a:fld>
             <a:endParaRPr lang="en-US"/>
           </a:p>
@@ -2162,7 +2162,7 @@
             <a:fld id="{1D8BD707-D9CF-40AE-B4C6-C98DA3205C09}" type="datetimeFigureOut">
               <a:rPr lang="en-US" smtClean="0"/>
               <a:pPr/>
-              <a:t>11/2/2016</a:t>
+              <a:t>11/12/2016</a:t>
             </a:fld>
             <a:endParaRPr lang="en-US"/>
           </a:p>
@@ -2327,7 +2327,7 @@
             <a:fld id="{1D8BD707-D9CF-40AE-B4C6-C98DA3205C09}" type="datetimeFigureOut">
               <a:rPr lang="en-US" smtClean="0"/>
               <a:pPr/>
-              <a:t>11/2/2016</a:t>
+              <a:t>11/12/2016</a:t>
             </a:fld>
             <a:endParaRPr lang="en-US"/>
           </a:p>
@@ -2569,7 +2569,7 @@
             <a:fld id="{1D8BD707-D9CF-40AE-B4C6-C98DA3205C09}" type="datetimeFigureOut">
               <a:rPr lang="en-US" smtClean="0"/>
               <a:pPr/>
-              <a:t>11/2/2016</a:t>
+              <a:t>11/12/2016</a:t>
             </a:fld>
             <a:endParaRPr lang="en-US"/>
           </a:p>
@@ -2851,7 +2851,7 @@
             <a:fld id="{1D8BD707-D9CF-40AE-B4C6-C98DA3205C09}" type="datetimeFigureOut">
               <a:rPr lang="en-US" smtClean="0"/>
               <a:pPr/>
-              <a:t>11/2/2016</a:t>
+              <a:t>11/12/2016</a:t>
             </a:fld>
             <a:endParaRPr lang="en-US"/>
           </a:p>
@@ -3267,7 +3267,7 @@
             <a:fld id="{1D8BD707-D9CF-40AE-B4C6-C98DA3205C09}" type="datetimeFigureOut">
               <a:rPr lang="en-US" smtClean="0"/>
               <a:pPr/>
-              <a:t>11/2/2016</a:t>
+              <a:t>11/12/2016</a:t>
             </a:fld>
             <a:endParaRPr lang="en-US"/>
           </a:p>
@@ -3381,7 +3381,7 @@
             <a:fld id="{1D8BD707-D9CF-40AE-B4C6-C98DA3205C09}" type="datetimeFigureOut">
               <a:rPr lang="en-US" smtClean="0"/>
               <a:pPr/>
-              <a:t>11/2/2016</a:t>
+              <a:t>11/12/2016</a:t>
             </a:fld>
             <a:endParaRPr lang="en-US"/>
           </a:p>
@@ -3473,7 +3473,7 @@
             <a:fld id="{1D8BD707-D9CF-40AE-B4C6-C98DA3205C09}" type="datetimeFigureOut">
               <a:rPr lang="en-US" smtClean="0"/>
               <a:pPr/>
-              <a:t>11/2/2016</a:t>
+              <a:t>11/12/2016</a:t>
             </a:fld>
             <a:endParaRPr lang="en-US"/>
           </a:p>
@@ -3745,7 +3745,7 @@
             <a:fld id="{1D8BD707-D9CF-40AE-B4C6-C98DA3205C09}" type="datetimeFigureOut">
               <a:rPr lang="en-US" smtClean="0"/>
               <a:pPr/>
-              <a:t>11/2/2016</a:t>
+              <a:t>11/12/2016</a:t>
             </a:fld>
             <a:endParaRPr lang="en-US"/>
           </a:p>
@@ -3994,7 +3994,7 @@
             <a:fld id="{1D8BD707-D9CF-40AE-B4C6-C98DA3205C09}" type="datetimeFigureOut">
               <a:rPr lang="en-US" smtClean="0"/>
               <a:pPr/>
-              <a:t>11/2/2016</a:t>
+              <a:t>11/12/2016</a:t>
             </a:fld>
             <a:endParaRPr lang="en-US"/>
           </a:p>
@@ -4202,7 +4202,7 @@
             <a:fld id="{1D8BD707-D9CF-40AE-B4C6-C98DA3205C09}" type="datetimeFigureOut">
               <a:rPr lang="en-US" smtClean="0"/>
               <a:pPr/>
-              <a:t>11/2/2016</a:t>
+              <a:t>11/12/2016</a:t>
             </a:fld>
             <a:endParaRPr lang="en-US"/>
           </a:p>
@@ -5080,7 +5080,7 @@
         </p:blipFill>
         <p:spPr bwMode="auto">
           <a:xfrm>
-            <a:off x="300038" y="533400"/>
+            <a:off x="300038" y="542925"/>
             <a:ext cx="8543925" cy="6238875"/>
           </a:xfrm>
           <a:prstGeom prst="rect">
@@ -7542,7 +7542,7 @@
         </p:nvCxnSpPr>
         <p:spPr>
           <a:xfrm rot="10800000">
-            <a:off x="4343400" y="4191000"/>
+            <a:off x="1960973" y="3273623"/>
             <a:ext cx="685800" cy="1588"/>
           </a:xfrm>
           <a:prstGeom prst="straightConnector1">
@@ -7575,7 +7575,7 @@
         </p:nvSpPr>
         <p:spPr>
           <a:xfrm>
-            <a:off x="4953000" y="4038600"/>
+            <a:off x="2570573" y="3121223"/>
             <a:ext cx="3601627" cy="307777"/>
           </a:xfrm>
           <a:prstGeom prst="rect">

</xml_diff>